<commit_message>
Update 'Object-oriented programming' section
</commit_message>
<xml_diff>
--- a/diagrams/uml/classDiagrams/associationClasses/bookLoan.pptx
+++ b/diagrams/uml/classDiagrams/associationClasses/bookLoan.pptx
@@ -161,7 +161,7 @@
           <a:lstStyle/>
           <a:p>
             <a:r>
-              <a:rPr lang="en-US" smtClean="0"/>
+              <a:rPr lang="en-US"/>
               <a:t>Click to edit Master title style</a:t>
             </a:r>
             <a:endParaRPr lang="en-SG"/>
@@ -280,7 +280,7 @@
           </a:lstStyle>
           <a:p>
             <a:r>
-              <a:rPr lang="en-US" smtClean="0"/>
+              <a:rPr lang="en-US"/>
               <a:t>Click to edit Master subtitle style</a:t>
             </a:r>
             <a:endParaRPr lang="en-SG"/>
@@ -304,7 +304,7 @@
           <a:p>
             <a:fld id="{A0F86979-30DA-49EE-A740-32EBA6D2B7DE}" type="datetimeFigureOut">
               <a:rPr lang="en-SG" smtClean="0"/>
-              <a:t>2/10/2017</a:t>
+              <a:t>28/11/2020</a:t>
             </a:fld>
             <a:endParaRPr lang="en-SG"/>
           </a:p>
@@ -398,7 +398,7 @@
           <a:lstStyle/>
           <a:p>
             <a:r>
-              <a:rPr lang="en-US" smtClean="0"/>
+              <a:rPr lang="en-US"/>
               <a:t>Click to edit Master title style</a:t>
             </a:r>
             <a:endParaRPr lang="en-SG"/>
@@ -422,35 +422,35 @@
           <a:p>
             <a:pPr lvl="0"/>
             <a:r>
-              <a:rPr lang="en-US" smtClean="0"/>
+              <a:rPr lang="en-US"/>
               <a:t>Click to edit Master text styles</a:t>
             </a:r>
           </a:p>
           <a:p>
             <a:pPr lvl="1"/>
             <a:r>
-              <a:rPr lang="en-US" smtClean="0"/>
+              <a:rPr lang="en-US"/>
               <a:t>Second level</a:t>
             </a:r>
           </a:p>
           <a:p>
             <a:pPr lvl="2"/>
             <a:r>
-              <a:rPr lang="en-US" smtClean="0"/>
+              <a:rPr lang="en-US"/>
               <a:t>Third level</a:t>
             </a:r>
           </a:p>
           <a:p>
             <a:pPr lvl="3"/>
             <a:r>
-              <a:rPr lang="en-US" smtClean="0"/>
+              <a:rPr lang="en-US"/>
               <a:t>Fourth level</a:t>
             </a:r>
           </a:p>
           <a:p>
             <a:pPr lvl="4"/>
             <a:r>
-              <a:rPr lang="en-US" smtClean="0"/>
+              <a:rPr lang="en-US"/>
               <a:t>Fifth level</a:t>
             </a:r>
             <a:endParaRPr lang="en-SG"/>
@@ -474,7 +474,7 @@
           <a:p>
             <a:fld id="{A0F86979-30DA-49EE-A740-32EBA6D2B7DE}" type="datetimeFigureOut">
               <a:rPr lang="en-SG" smtClean="0"/>
-              <a:t>2/10/2017</a:t>
+              <a:t>28/11/2020</a:t>
             </a:fld>
             <a:endParaRPr lang="en-SG"/>
           </a:p>
@@ -573,7 +573,7 @@
           <a:lstStyle/>
           <a:p>
             <a:r>
-              <a:rPr lang="en-US" smtClean="0"/>
+              <a:rPr lang="en-US"/>
               <a:t>Click to edit Master title style</a:t>
             </a:r>
             <a:endParaRPr lang="en-SG"/>
@@ -602,35 +602,35 @@
           <a:p>
             <a:pPr lvl="0"/>
             <a:r>
-              <a:rPr lang="en-US" smtClean="0"/>
+              <a:rPr lang="en-US"/>
               <a:t>Click to edit Master text styles</a:t>
             </a:r>
           </a:p>
           <a:p>
             <a:pPr lvl="1"/>
             <a:r>
-              <a:rPr lang="en-US" smtClean="0"/>
+              <a:rPr lang="en-US"/>
               <a:t>Second level</a:t>
             </a:r>
           </a:p>
           <a:p>
             <a:pPr lvl="2"/>
             <a:r>
-              <a:rPr lang="en-US" smtClean="0"/>
+              <a:rPr lang="en-US"/>
               <a:t>Third level</a:t>
             </a:r>
           </a:p>
           <a:p>
             <a:pPr lvl="3"/>
             <a:r>
-              <a:rPr lang="en-US" smtClean="0"/>
+              <a:rPr lang="en-US"/>
               <a:t>Fourth level</a:t>
             </a:r>
           </a:p>
           <a:p>
             <a:pPr lvl="4"/>
             <a:r>
-              <a:rPr lang="en-US" smtClean="0"/>
+              <a:rPr lang="en-US"/>
               <a:t>Fifth level</a:t>
             </a:r>
             <a:endParaRPr lang="en-SG"/>
@@ -654,7 +654,7 @@
           <a:p>
             <a:fld id="{A0F86979-30DA-49EE-A740-32EBA6D2B7DE}" type="datetimeFigureOut">
               <a:rPr lang="en-SG" smtClean="0"/>
-              <a:t>2/10/2017</a:t>
+              <a:t>28/11/2020</a:t>
             </a:fld>
             <a:endParaRPr lang="en-SG"/>
           </a:p>
@@ -748,7 +748,7 @@
           <a:lstStyle/>
           <a:p>
             <a:r>
-              <a:rPr lang="en-US" smtClean="0"/>
+              <a:rPr lang="en-US"/>
               <a:t>Click to edit Master title style</a:t>
             </a:r>
             <a:endParaRPr lang="en-SG"/>
@@ -772,35 +772,35 @@
           <a:p>
             <a:pPr lvl="0"/>
             <a:r>
-              <a:rPr lang="en-US" smtClean="0"/>
+              <a:rPr lang="en-US"/>
               <a:t>Click to edit Master text styles</a:t>
             </a:r>
           </a:p>
           <a:p>
             <a:pPr lvl="1"/>
             <a:r>
-              <a:rPr lang="en-US" smtClean="0"/>
+              <a:rPr lang="en-US"/>
               <a:t>Second level</a:t>
             </a:r>
           </a:p>
           <a:p>
             <a:pPr lvl="2"/>
             <a:r>
-              <a:rPr lang="en-US" smtClean="0"/>
+              <a:rPr lang="en-US"/>
               <a:t>Third level</a:t>
             </a:r>
           </a:p>
           <a:p>
             <a:pPr lvl="3"/>
             <a:r>
-              <a:rPr lang="en-US" smtClean="0"/>
+              <a:rPr lang="en-US"/>
               <a:t>Fourth level</a:t>
             </a:r>
           </a:p>
           <a:p>
             <a:pPr lvl="4"/>
             <a:r>
-              <a:rPr lang="en-US" smtClean="0"/>
+              <a:rPr lang="en-US"/>
               <a:t>Fifth level</a:t>
             </a:r>
             <a:endParaRPr lang="en-SG"/>
@@ -824,7 +824,7 @@
           <a:p>
             <a:fld id="{A0F86979-30DA-49EE-A740-32EBA6D2B7DE}" type="datetimeFigureOut">
               <a:rPr lang="en-SG" smtClean="0"/>
-              <a:t>2/10/2017</a:t>
+              <a:t>28/11/2020</a:t>
             </a:fld>
             <a:endParaRPr lang="en-SG"/>
           </a:p>
@@ -927,7 +927,7 @@
           </a:lstStyle>
           <a:p>
             <a:r>
-              <a:rPr lang="en-US" smtClean="0"/>
+              <a:rPr lang="en-US"/>
               <a:t>Click to edit Master title style</a:t>
             </a:r>
             <a:endParaRPr lang="en-SG"/>
@@ -1047,7 +1047,7 @@
           <a:p>
             <a:pPr lvl="0"/>
             <a:r>
-              <a:rPr lang="en-US" smtClean="0"/>
+              <a:rPr lang="en-US"/>
               <a:t>Click to edit Master text styles</a:t>
             </a:r>
           </a:p>
@@ -1070,7 +1070,7 @@
           <a:p>
             <a:fld id="{A0F86979-30DA-49EE-A740-32EBA6D2B7DE}" type="datetimeFigureOut">
               <a:rPr lang="en-SG" smtClean="0"/>
-              <a:t>2/10/2017</a:t>
+              <a:t>28/11/2020</a:t>
             </a:fld>
             <a:endParaRPr lang="en-SG"/>
           </a:p>
@@ -1164,7 +1164,7 @@
           <a:lstStyle/>
           <a:p>
             <a:r>
-              <a:rPr lang="en-US" smtClean="0"/>
+              <a:rPr lang="en-US"/>
               <a:t>Click to edit Master title style</a:t>
             </a:r>
             <a:endParaRPr lang="en-SG"/>
@@ -1221,35 +1221,35 @@
           <a:p>
             <a:pPr lvl="0"/>
             <a:r>
-              <a:rPr lang="en-US" smtClean="0"/>
+              <a:rPr lang="en-US"/>
               <a:t>Click to edit Master text styles</a:t>
             </a:r>
           </a:p>
           <a:p>
             <a:pPr lvl="1"/>
             <a:r>
-              <a:rPr lang="en-US" smtClean="0"/>
+              <a:rPr lang="en-US"/>
               <a:t>Second level</a:t>
             </a:r>
           </a:p>
           <a:p>
             <a:pPr lvl="2"/>
             <a:r>
-              <a:rPr lang="en-US" smtClean="0"/>
+              <a:rPr lang="en-US"/>
               <a:t>Third level</a:t>
             </a:r>
           </a:p>
           <a:p>
             <a:pPr lvl="3"/>
             <a:r>
-              <a:rPr lang="en-US" smtClean="0"/>
+              <a:rPr lang="en-US"/>
               <a:t>Fourth level</a:t>
             </a:r>
           </a:p>
           <a:p>
             <a:pPr lvl="4"/>
             <a:r>
-              <a:rPr lang="en-US" smtClean="0"/>
+              <a:rPr lang="en-US"/>
               <a:t>Fifth level</a:t>
             </a:r>
             <a:endParaRPr lang="en-SG"/>
@@ -1306,35 +1306,35 @@
           <a:p>
             <a:pPr lvl="0"/>
             <a:r>
-              <a:rPr lang="en-US" smtClean="0"/>
+              <a:rPr lang="en-US"/>
               <a:t>Click to edit Master text styles</a:t>
             </a:r>
           </a:p>
           <a:p>
             <a:pPr lvl="1"/>
             <a:r>
-              <a:rPr lang="en-US" smtClean="0"/>
+              <a:rPr lang="en-US"/>
               <a:t>Second level</a:t>
             </a:r>
           </a:p>
           <a:p>
             <a:pPr lvl="2"/>
             <a:r>
-              <a:rPr lang="en-US" smtClean="0"/>
+              <a:rPr lang="en-US"/>
               <a:t>Third level</a:t>
             </a:r>
           </a:p>
           <a:p>
             <a:pPr lvl="3"/>
             <a:r>
-              <a:rPr lang="en-US" smtClean="0"/>
+              <a:rPr lang="en-US"/>
               <a:t>Fourth level</a:t>
             </a:r>
           </a:p>
           <a:p>
             <a:pPr lvl="4"/>
             <a:r>
-              <a:rPr lang="en-US" smtClean="0"/>
+              <a:rPr lang="en-US"/>
               <a:t>Fifth level</a:t>
             </a:r>
             <a:endParaRPr lang="en-SG"/>
@@ -1358,7 +1358,7 @@
           <a:p>
             <a:fld id="{A0F86979-30DA-49EE-A740-32EBA6D2B7DE}" type="datetimeFigureOut">
               <a:rPr lang="en-SG" smtClean="0"/>
-              <a:t>2/10/2017</a:t>
+              <a:t>28/11/2020</a:t>
             </a:fld>
             <a:endParaRPr lang="en-SG"/>
           </a:p>
@@ -1456,7 +1456,7 @@
           </a:lstStyle>
           <a:p>
             <a:r>
-              <a:rPr lang="en-US" smtClean="0"/>
+              <a:rPr lang="en-US"/>
               <a:t>Click to edit Master title style</a:t>
             </a:r>
             <a:endParaRPr lang="en-SG"/>
@@ -1522,7 +1522,7 @@
           <a:p>
             <a:pPr lvl="0"/>
             <a:r>
-              <a:rPr lang="en-US" smtClean="0"/>
+              <a:rPr lang="en-US"/>
               <a:t>Click to edit Master text styles</a:t>
             </a:r>
           </a:p>
@@ -1578,35 +1578,35 @@
           <a:p>
             <a:pPr lvl="0"/>
             <a:r>
-              <a:rPr lang="en-US" smtClean="0"/>
+              <a:rPr lang="en-US"/>
               <a:t>Click to edit Master text styles</a:t>
             </a:r>
           </a:p>
           <a:p>
             <a:pPr lvl="1"/>
             <a:r>
-              <a:rPr lang="en-US" smtClean="0"/>
+              <a:rPr lang="en-US"/>
               <a:t>Second level</a:t>
             </a:r>
           </a:p>
           <a:p>
             <a:pPr lvl="2"/>
             <a:r>
-              <a:rPr lang="en-US" smtClean="0"/>
+              <a:rPr lang="en-US"/>
               <a:t>Third level</a:t>
             </a:r>
           </a:p>
           <a:p>
             <a:pPr lvl="3"/>
             <a:r>
-              <a:rPr lang="en-US" smtClean="0"/>
+              <a:rPr lang="en-US"/>
               <a:t>Fourth level</a:t>
             </a:r>
           </a:p>
           <a:p>
             <a:pPr lvl="4"/>
             <a:r>
-              <a:rPr lang="en-US" smtClean="0"/>
+              <a:rPr lang="en-US"/>
               <a:t>Fifth level</a:t>
             </a:r>
             <a:endParaRPr lang="en-SG"/>
@@ -1672,7 +1672,7 @@
           <a:p>
             <a:pPr lvl="0"/>
             <a:r>
-              <a:rPr lang="en-US" smtClean="0"/>
+              <a:rPr lang="en-US"/>
               <a:t>Click to edit Master text styles</a:t>
             </a:r>
           </a:p>
@@ -1728,35 +1728,35 @@
           <a:p>
             <a:pPr lvl="0"/>
             <a:r>
-              <a:rPr lang="en-US" smtClean="0"/>
+              <a:rPr lang="en-US"/>
               <a:t>Click to edit Master text styles</a:t>
             </a:r>
           </a:p>
           <a:p>
             <a:pPr lvl="1"/>
             <a:r>
-              <a:rPr lang="en-US" smtClean="0"/>
+              <a:rPr lang="en-US"/>
               <a:t>Second level</a:t>
             </a:r>
           </a:p>
           <a:p>
             <a:pPr lvl="2"/>
             <a:r>
-              <a:rPr lang="en-US" smtClean="0"/>
+              <a:rPr lang="en-US"/>
               <a:t>Third level</a:t>
             </a:r>
           </a:p>
           <a:p>
             <a:pPr lvl="3"/>
             <a:r>
-              <a:rPr lang="en-US" smtClean="0"/>
+              <a:rPr lang="en-US"/>
               <a:t>Fourth level</a:t>
             </a:r>
           </a:p>
           <a:p>
             <a:pPr lvl="4"/>
             <a:r>
-              <a:rPr lang="en-US" smtClean="0"/>
+              <a:rPr lang="en-US"/>
               <a:t>Fifth level</a:t>
             </a:r>
             <a:endParaRPr lang="en-SG"/>
@@ -1780,7 +1780,7 @@
           <a:p>
             <a:fld id="{A0F86979-30DA-49EE-A740-32EBA6D2B7DE}" type="datetimeFigureOut">
               <a:rPr lang="en-SG" smtClean="0"/>
-              <a:t>2/10/2017</a:t>
+              <a:t>28/11/2020</a:t>
             </a:fld>
             <a:endParaRPr lang="en-SG"/>
           </a:p>
@@ -1874,7 +1874,7 @@
           <a:lstStyle/>
           <a:p>
             <a:r>
-              <a:rPr lang="en-US" smtClean="0"/>
+              <a:rPr lang="en-US"/>
               <a:t>Click to edit Master title style</a:t>
             </a:r>
             <a:endParaRPr lang="en-SG"/>
@@ -1898,7 +1898,7 @@
           <a:p>
             <a:fld id="{A0F86979-30DA-49EE-A740-32EBA6D2B7DE}" type="datetimeFigureOut">
               <a:rPr lang="en-SG" smtClean="0"/>
-              <a:t>2/10/2017</a:t>
+              <a:t>28/11/2020</a:t>
             </a:fld>
             <a:endParaRPr lang="en-SG"/>
           </a:p>
@@ -1993,7 +1993,7 @@
           <a:p>
             <a:fld id="{A0F86979-30DA-49EE-A740-32EBA6D2B7DE}" type="datetimeFigureOut">
               <a:rPr lang="en-SG" smtClean="0"/>
-              <a:t>2/10/2017</a:t>
+              <a:t>28/11/2020</a:t>
             </a:fld>
             <a:endParaRPr lang="en-SG"/>
           </a:p>
@@ -2096,7 +2096,7 @@
           </a:lstStyle>
           <a:p>
             <a:r>
-              <a:rPr lang="en-US" smtClean="0"/>
+              <a:rPr lang="en-US"/>
               <a:t>Click to edit Master title style</a:t>
             </a:r>
             <a:endParaRPr lang="en-SG"/>
@@ -2153,35 +2153,35 @@
           <a:p>
             <a:pPr lvl="0"/>
             <a:r>
-              <a:rPr lang="en-US" smtClean="0"/>
+              <a:rPr lang="en-US"/>
               <a:t>Click to edit Master text styles</a:t>
             </a:r>
           </a:p>
           <a:p>
             <a:pPr lvl="1"/>
             <a:r>
-              <a:rPr lang="en-US" smtClean="0"/>
+              <a:rPr lang="en-US"/>
               <a:t>Second level</a:t>
             </a:r>
           </a:p>
           <a:p>
             <a:pPr lvl="2"/>
             <a:r>
-              <a:rPr lang="en-US" smtClean="0"/>
+              <a:rPr lang="en-US"/>
               <a:t>Third level</a:t>
             </a:r>
           </a:p>
           <a:p>
             <a:pPr lvl="3"/>
             <a:r>
-              <a:rPr lang="en-US" smtClean="0"/>
+              <a:rPr lang="en-US"/>
               <a:t>Fourth level</a:t>
             </a:r>
           </a:p>
           <a:p>
             <a:pPr lvl="4"/>
             <a:r>
-              <a:rPr lang="en-US" smtClean="0"/>
+              <a:rPr lang="en-US"/>
               <a:t>Fifth level</a:t>
             </a:r>
             <a:endParaRPr lang="en-SG"/>
@@ -2247,7 +2247,7 @@
           <a:p>
             <a:pPr lvl="0"/>
             <a:r>
-              <a:rPr lang="en-US" smtClean="0"/>
+              <a:rPr lang="en-US"/>
               <a:t>Click to edit Master text styles</a:t>
             </a:r>
           </a:p>
@@ -2270,7 +2270,7 @@
           <a:p>
             <a:fld id="{A0F86979-30DA-49EE-A740-32EBA6D2B7DE}" type="datetimeFigureOut">
               <a:rPr lang="en-SG" smtClean="0"/>
-              <a:t>2/10/2017</a:t>
+              <a:t>28/11/2020</a:t>
             </a:fld>
             <a:endParaRPr lang="en-SG"/>
           </a:p>
@@ -2373,7 +2373,7 @@
           </a:lstStyle>
           <a:p>
             <a:r>
-              <a:rPr lang="en-US" smtClean="0"/>
+              <a:rPr lang="en-US"/>
               <a:t>Click to edit Master title style</a:t>
             </a:r>
             <a:endParaRPr lang="en-SG"/>
@@ -2500,7 +2500,7 @@
           <a:p>
             <a:pPr lvl="0"/>
             <a:r>
-              <a:rPr lang="en-US" smtClean="0"/>
+              <a:rPr lang="en-US"/>
               <a:t>Click to edit Master text styles</a:t>
             </a:r>
           </a:p>
@@ -2523,7 +2523,7 @@
           <a:p>
             <a:fld id="{A0F86979-30DA-49EE-A740-32EBA6D2B7DE}" type="datetimeFigureOut">
               <a:rPr lang="en-SG" smtClean="0"/>
-              <a:t>2/10/2017</a:t>
+              <a:t>28/11/2020</a:t>
             </a:fld>
             <a:endParaRPr lang="en-SG"/>
           </a:p>
@@ -2632,7 +2632,7 @@
           <a:lstStyle/>
           <a:p>
             <a:r>
-              <a:rPr lang="en-US" smtClean="0"/>
+              <a:rPr lang="en-US"/>
               <a:t>Click to edit Master title style</a:t>
             </a:r>
             <a:endParaRPr lang="en-SG"/>
@@ -2666,35 +2666,35 @@
           <a:p>
             <a:pPr lvl="0"/>
             <a:r>
-              <a:rPr lang="en-US" smtClean="0"/>
+              <a:rPr lang="en-US"/>
               <a:t>Click to edit Master text styles</a:t>
             </a:r>
           </a:p>
           <a:p>
             <a:pPr lvl="1"/>
             <a:r>
-              <a:rPr lang="en-US" smtClean="0"/>
+              <a:rPr lang="en-US"/>
               <a:t>Second level</a:t>
             </a:r>
           </a:p>
           <a:p>
             <a:pPr lvl="2"/>
             <a:r>
-              <a:rPr lang="en-US" smtClean="0"/>
+              <a:rPr lang="en-US"/>
               <a:t>Third level</a:t>
             </a:r>
           </a:p>
           <a:p>
             <a:pPr lvl="3"/>
             <a:r>
-              <a:rPr lang="en-US" smtClean="0"/>
+              <a:rPr lang="en-US"/>
               <a:t>Fourth level</a:t>
             </a:r>
           </a:p>
           <a:p>
             <a:pPr lvl="4"/>
             <a:r>
-              <a:rPr lang="en-US" smtClean="0"/>
+              <a:rPr lang="en-US"/>
               <a:t>Fifth level</a:t>
             </a:r>
             <a:endParaRPr lang="en-SG"/>
@@ -2736,7 +2736,7 @@
           <a:p>
             <a:fld id="{A0F86979-30DA-49EE-A740-32EBA6D2B7DE}" type="datetimeFigureOut">
               <a:rPr lang="en-SG" smtClean="0"/>
-              <a:t>2/10/2017</a:t>
+              <a:t>28/11/2020</a:t>
             </a:fld>
             <a:endParaRPr lang="en-SG"/>
           </a:p>
@@ -3165,7 +3165,7 @@
               <a:defRPr/>
             </a:pPr>
             <a:r>
-              <a:rPr lang="en-US" sz="2200" kern="0" noProof="0" dirty="0" err="1" smtClean="0">
+              <a:rPr lang="en-US" sz="2200" kern="0" noProof="0" dirty="0" err="1">
                 <a:solidFill>
                   <a:sysClr val="windowText" lastClr="000000"/>
                 </a:solidFill>
@@ -3242,7 +3242,7 @@
               <a:defRPr/>
             </a:pPr>
             <a:r>
-              <a:rPr lang="en-US" sz="2200" kern="0" dirty="0" smtClean="0">
+              <a:rPr lang="en-US" sz="2200" kern="0" dirty="0">
                 <a:solidFill>
                   <a:sysClr val="windowText" lastClr="000000"/>
                 </a:solidFill>
@@ -3319,7 +3319,7 @@
               <a:defRPr/>
             </a:pPr>
             <a:r>
-              <a:rPr lang="en-US" sz="2200" kern="0" dirty="0" smtClean="0">
+              <a:rPr lang="en-US" sz="2200" kern="0" dirty="0">
                 <a:solidFill>
                   <a:sysClr val="windowText" lastClr="000000"/>
                 </a:solidFill>
@@ -3396,15 +3396,15 @@
               <a:defRPr/>
             </a:pPr>
             <a:r>
-              <a:rPr lang="en-US" sz="2000" kern="0" dirty="0" err="1" smtClean="0">
+              <a:rPr lang="en-US" sz="2000" kern="0" dirty="0" err="1">
                 <a:solidFill>
                   <a:sysClr val="windowText" lastClr="000000"/>
                 </a:solidFill>
                 <a:latin typeface="Calibri" pitchFamily="34" charset="0"/>
               </a:rPr>
-              <a:t>loadDate</a:t>
-            </a:r>
-            <a:endParaRPr lang="en-US" sz="2000" kern="0" dirty="0" smtClean="0">
+              <a:t>loanDate</a:t>
+            </a:r>
+            <a:endParaRPr lang="en-US" sz="2000" kern="0" dirty="0">
               <a:solidFill>
                 <a:sysClr val="windowText" lastClr="000000"/>
               </a:solidFill>
@@ -3430,7 +3430,7 @@
               <a:defRPr/>
             </a:pPr>
             <a:r>
-              <a:rPr kumimoji="0" lang="en-US" sz="2000" b="0" i="0" u="none" strike="noStrike" kern="0" cap="none" spc="0" normalizeH="0" baseline="0" noProof="0" dirty="0" err="1" smtClean="0">
+              <a:rPr kumimoji="0" lang="en-US" sz="2000" b="0" i="0" u="none" strike="noStrike" kern="0" cap="none" spc="0" normalizeH="0" baseline="0" noProof="0" dirty="0" err="1">
                 <a:ln>
                   <a:noFill/>
                 </a:ln>
@@ -3513,7 +3513,7 @@
               <a:defRPr/>
             </a:pPr>
             <a:r>
-              <a:rPr lang="en-US" sz="2000" kern="0" dirty="0" smtClean="0">
+              <a:rPr lang="en-US" sz="2000" kern="0" dirty="0">
                 <a:solidFill>
                   <a:sysClr val="windowText" lastClr="000000"/>
                 </a:solidFill>
@@ -3626,10 +3626,9 @@
           <a:lstStyle/>
           <a:p>
             <a:r>
-              <a:rPr lang="en-US" dirty="0" smtClean="0"/>
+              <a:rPr lang="en-US" dirty="0"/>
               <a:t>borrows</a:t>
             </a:r>
-            <a:endParaRPr lang="en-US" dirty="0"/>
           </a:p>
         </p:txBody>
       </p:sp>

</xml_diff>